<commit_message>
Commit lean et PB
</commit_message>
<xml_diff>
--- a/lean-canvas-ProxiBanqueSI.pptx
+++ b/lean-canvas-ProxiBanqueSI.pptx
@@ -107,6 +107,22 @@
       </a:defRPr>
     </a:lvl9pPr>
   </p:defaultTextStyle>
+  <p:extLst>
+    <p:ext uri="{EFAFB233-063F-42B5-8137-9DF3F51BA10A}">
+      <p15:sldGuideLst xmlns:p15="http://schemas.microsoft.com/office/powerpoint/2012/main">
+        <p15:guide id="1" orient="horz" pos="2160">
+          <p15:clr>
+            <a:srgbClr val="A4A3A4"/>
+          </p15:clr>
+        </p15:guide>
+        <p15:guide id="2" pos="2880">
+          <p15:clr>
+            <a:srgbClr val="A4A3A4"/>
+          </p15:clr>
+        </p15:guide>
+      </p15:sldGuideLst>
+    </p:ext>
+  </p:extLst>
 </p:presentation>
 </file>
 
@@ -192,7 +208,7 @@
           <a:p>
             <a:fld id="{479FEF38-24CA-444D-8E5D-5C6061C6B495}" type="datetimeFigureOut">
               <a:rPr lang="en-US" smtClean="0"/>
-              <a:t>06/01/18</a:t>
+              <a:t>1/10/2018</a:t>
             </a:fld>
             <a:endParaRPr lang="en-US"/>
           </a:p>
@@ -351,7 +367,7 @@
           <a:p>
             <a:fld id="{0BEC1035-22C6-4F8A-960B-5C00BC661B2D}" type="slidenum">
               <a:rPr lang="en-US" smtClean="0"/>
-              <a:t>‹#›</a:t>
+              <a:t>‹N°›</a:t>
             </a:fld>
             <a:endParaRPr lang="en-US"/>
           </a:p>
@@ -641,7 +657,7 @@
           <a:p>
             <a:fld id="{8D2F9B37-4FC8-4EEB-BE2F-2081A1907109}" type="datetimeFigureOut">
               <a:rPr lang="en-US" smtClean="0"/>
-              <a:t>06/01/18</a:t>
+              <a:t>1/10/2018</a:t>
             </a:fld>
             <a:endParaRPr lang="en-US"/>
           </a:p>
@@ -683,7 +699,7 @@
           <a:p>
             <a:fld id="{7B8CCAFD-1043-42B6-864E-C32A387FD4D1}" type="slidenum">
               <a:rPr lang="en-US" smtClean="0"/>
-              <a:t>‹#›</a:t>
+              <a:t>‹N°›</a:t>
             </a:fld>
             <a:endParaRPr lang="en-US"/>
           </a:p>
@@ -811,7 +827,7 @@
           <a:p>
             <a:fld id="{8D2F9B37-4FC8-4EEB-BE2F-2081A1907109}" type="datetimeFigureOut">
               <a:rPr lang="en-US" smtClean="0"/>
-              <a:t>06/01/18</a:t>
+              <a:t>1/10/2018</a:t>
             </a:fld>
             <a:endParaRPr lang="en-US"/>
           </a:p>
@@ -853,7 +869,7 @@
           <a:p>
             <a:fld id="{7B8CCAFD-1043-42B6-864E-C32A387FD4D1}" type="slidenum">
               <a:rPr lang="en-US" smtClean="0"/>
-              <a:t>‹#›</a:t>
+              <a:t>‹N°›</a:t>
             </a:fld>
             <a:endParaRPr lang="en-US"/>
           </a:p>
@@ -991,7 +1007,7 @@
           <a:p>
             <a:fld id="{8D2F9B37-4FC8-4EEB-BE2F-2081A1907109}" type="datetimeFigureOut">
               <a:rPr lang="en-US" smtClean="0"/>
-              <a:t>06/01/18</a:t>
+              <a:t>1/10/2018</a:t>
             </a:fld>
             <a:endParaRPr lang="en-US"/>
           </a:p>
@@ -1033,7 +1049,7 @@
           <a:p>
             <a:fld id="{7B8CCAFD-1043-42B6-864E-C32A387FD4D1}" type="slidenum">
               <a:rPr lang="en-US" smtClean="0"/>
-              <a:t>‹#›</a:t>
+              <a:t>‹N°›</a:t>
             </a:fld>
             <a:endParaRPr lang="en-US"/>
           </a:p>
@@ -1161,7 +1177,7 @@
           <a:p>
             <a:fld id="{8D2F9B37-4FC8-4EEB-BE2F-2081A1907109}" type="datetimeFigureOut">
               <a:rPr lang="en-US" smtClean="0"/>
-              <a:t>06/01/18</a:t>
+              <a:t>1/10/2018</a:t>
             </a:fld>
             <a:endParaRPr lang="en-US"/>
           </a:p>
@@ -1203,7 +1219,7 @@
           <a:p>
             <a:fld id="{7B8CCAFD-1043-42B6-864E-C32A387FD4D1}" type="slidenum">
               <a:rPr lang="en-US" smtClean="0"/>
-              <a:t>‹#›</a:t>
+              <a:t>‹N°›</a:t>
             </a:fld>
             <a:endParaRPr lang="en-US"/>
           </a:p>
@@ -1407,7 +1423,7 @@
           <a:p>
             <a:fld id="{8D2F9B37-4FC8-4EEB-BE2F-2081A1907109}" type="datetimeFigureOut">
               <a:rPr lang="en-US" smtClean="0"/>
-              <a:t>06/01/18</a:t>
+              <a:t>1/10/2018</a:t>
             </a:fld>
             <a:endParaRPr lang="en-US"/>
           </a:p>
@@ -1449,7 +1465,7 @@
           <a:p>
             <a:fld id="{7B8CCAFD-1043-42B6-864E-C32A387FD4D1}" type="slidenum">
               <a:rPr lang="en-US" smtClean="0"/>
-              <a:t>‹#›</a:t>
+              <a:t>‹N°›</a:t>
             </a:fld>
             <a:endParaRPr lang="en-US"/>
           </a:p>
@@ -1695,7 +1711,7 @@
           <a:p>
             <a:fld id="{8D2F9B37-4FC8-4EEB-BE2F-2081A1907109}" type="datetimeFigureOut">
               <a:rPr lang="en-US" smtClean="0"/>
-              <a:t>06/01/18</a:t>
+              <a:t>1/10/2018</a:t>
             </a:fld>
             <a:endParaRPr lang="en-US"/>
           </a:p>
@@ -1737,7 +1753,7 @@
           <a:p>
             <a:fld id="{7B8CCAFD-1043-42B6-864E-C32A387FD4D1}" type="slidenum">
               <a:rPr lang="en-US" smtClean="0"/>
-              <a:t>‹#›</a:t>
+              <a:t>‹N°›</a:t>
             </a:fld>
             <a:endParaRPr lang="en-US"/>
           </a:p>
@@ -2117,7 +2133,7 @@
           <a:p>
             <a:fld id="{8D2F9B37-4FC8-4EEB-BE2F-2081A1907109}" type="datetimeFigureOut">
               <a:rPr lang="en-US" smtClean="0"/>
-              <a:t>06/01/18</a:t>
+              <a:t>1/10/2018</a:t>
             </a:fld>
             <a:endParaRPr lang="en-US"/>
           </a:p>
@@ -2159,7 +2175,7 @@
           <a:p>
             <a:fld id="{7B8CCAFD-1043-42B6-864E-C32A387FD4D1}" type="slidenum">
               <a:rPr lang="en-US" smtClean="0"/>
-              <a:t>‹#›</a:t>
+              <a:t>‹N°›</a:t>
             </a:fld>
             <a:endParaRPr lang="en-US"/>
           </a:p>
@@ -2235,7 +2251,7 @@
           <a:p>
             <a:fld id="{8D2F9B37-4FC8-4EEB-BE2F-2081A1907109}" type="datetimeFigureOut">
               <a:rPr lang="en-US" smtClean="0"/>
-              <a:t>06/01/18</a:t>
+              <a:t>1/10/2018</a:t>
             </a:fld>
             <a:endParaRPr lang="en-US"/>
           </a:p>
@@ -2277,7 +2293,7 @@
           <a:p>
             <a:fld id="{7B8CCAFD-1043-42B6-864E-C32A387FD4D1}" type="slidenum">
               <a:rPr lang="en-US" smtClean="0"/>
-              <a:t>‹#›</a:t>
+              <a:t>‹N°›</a:t>
             </a:fld>
             <a:endParaRPr lang="en-US"/>
           </a:p>
@@ -2330,7 +2346,7 @@
           <a:p>
             <a:fld id="{8D2F9B37-4FC8-4EEB-BE2F-2081A1907109}" type="datetimeFigureOut">
               <a:rPr lang="en-US" smtClean="0"/>
-              <a:t>06/01/18</a:t>
+              <a:t>1/10/2018</a:t>
             </a:fld>
             <a:endParaRPr lang="en-US"/>
           </a:p>
@@ -2372,7 +2388,7 @@
           <a:p>
             <a:fld id="{7B8CCAFD-1043-42B6-864E-C32A387FD4D1}" type="slidenum">
               <a:rPr lang="en-US" smtClean="0"/>
-              <a:t>‹#›</a:t>
+              <a:t>‹N°›</a:t>
             </a:fld>
             <a:endParaRPr lang="en-US"/>
           </a:p>
@@ -2607,7 +2623,7 @@
           <a:p>
             <a:fld id="{8D2F9B37-4FC8-4EEB-BE2F-2081A1907109}" type="datetimeFigureOut">
               <a:rPr lang="en-US" smtClean="0"/>
-              <a:t>06/01/18</a:t>
+              <a:t>1/10/2018</a:t>
             </a:fld>
             <a:endParaRPr lang="en-US"/>
           </a:p>
@@ -2649,7 +2665,7 @@
           <a:p>
             <a:fld id="{7B8CCAFD-1043-42B6-864E-C32A387FD4D1}" type="slidenum">
               <a:rPr lang="en-US" smtClean="0"/>
-              <a:t>‹#›</a:t>
+              <a:t>‹N°›</a:t>
             </a:fld>
             <a:endParaRPr lang="en-US"/>
           </a:p>
@@ -2860,7 +2876,7 @@
           <a:p>
             <a:fld id="{8D2F9B37-4FC8-4EEB-BE2F-2081A1907109}" type="datetimeFigureOut">
               <a:rPr lang="en-US" smtClean="0"/>
-              <a:t>06/01/18</a:t>
+              <a:t>1/10/2018</a:t>
             </a:fld>
             <a:endParaRPr lang="en-US"/>
           </a:p>
@@ -2902,7 +2918,7 @@
           <a:p>
             <a:fld id="{7B8CCAFD-1043-42B6-864E-C32A387FD4D1}" type="slidenum">
               <a:rPr lang="en-US" smtClean="0"/>
-              <a:t>‹#›</a:t>
+              <a:t>‹N°›</a:t>
             </a:fld>
             <a:endParaRPr lang="en-US"/>
           </a:p>
@@ -3073,7 +3089,7 @@
           <a:p>
             <a:fld id="{8D2F9B37-4FC8-4EEB-BE2F-2081A1907109}" type="datetimeFigureOut">
               <a:rPr lang="en-US" smtClean="0"/>
-              <a:t>06/01/18</a:t>
+              <a:t>1/10/2018</a:t>
             </a:fld>
             <a:endParaRPr lang="en-US"/>
           </a:p>
@@ -3151,7 +3167,7 @@
           <a:p>
             <a:fld id="{7B8CCAFD-1043-42B6-864E-C32A387FD4D1}" type="slidenum">
               <a:rPr lang="en-US" smtClean="0"/>
-              <a:t>‹#›</a:t>
+              <a:t>‹N°›</a:t>
             </a:fld>
             <a:endParaRPr lang="en-US"/>
           </a:p>
@@ -3471,7 +3487,7 @@
           <a:lstStyle/>
           <a:p>
             <a:r>
-              <a:rPr lang="fr-FR" sz="2400" b="1" smtClean="0">
+              <a:rPr lang="fr-FR" sz="2400" b="1" dirty="0" err="1" smtClean="0">
                 <a:solidFill>
                   <a:schemeClr val="tx1">
                     <a:lumMod val="65000"/>
@@ -3479,9 +3495,42 @@
                   </a:schemeClr>
                 </a:solidFill>
               </a:rPr>
-              <a:t>ProxiBanque SI Lean Canvas</a:t>
-            </a:r>
-            <a:endParaRPr lang="fr-FR" sz="2400" b="1">
+              <a:t>ProxiBanqueSI</a:t>
+            </a:r>
+            <a:r>
+              <a:rPr lang="fr-FR" sz="2400" b="1" dirty="0" smtClean="0">
+                <a:solidFill>
+                  <a:schemeClr val="tx1">
+                    <a:lumMod val="65000"/>
+                    <a:lumOff val="35000"/>
+                  </a:schemeClr>
+                </a:solidFill>
+              </a:rPr>
+              <a:t> </a:t>
+            </a:r>
+            <a:r>
+              <a:rPr lang="fr-FR" sz="2400" b="1" dirty="0" smtClean="0">
+                <a:solidFill>
+                  <a:schemeClr val="tx1">
+                    <a:lumMod val="65000"/>
+                    <a:lumOff val="35000"/>
+                  </a:schemeClr>
+                </a:solidFill>
+              </a:rPr>
+              <a:t>Lean </a:t>
+            </a:r>
+            <a:r>
+              <a:rPr lang="fr-FR" sz="2400" b="1" dirty="0" err="1" smtClean="0">
+                <a:solidFill>
+                  <a:schemeClr val="tx1">
+                    <a:lumMod val="65000"/>
+                    <a:lumOff val="35000"/>
+                  </a:schemeClr>
+                </a:solidFill>
+              </a:rPr>
+              <a:t>Canvas</a:t>
+            </a:r>
+            <a:endParaRPr lang="fr-FR" sz="2400" b="1" dirty="0">
               <a:solidFill>
                 <a:schemeClr val="tx1">
                   <a:lumMod val="65000"/>
@@ -3697,6 +3746,24 @@
               <a:cs typeface="Arial" pitchFamily="34" charset="0"/>
             </a:endParaRPr>
           </a:p>
+          <a:p>
+            <a:endParaRPr lang="fr-FR" sz="1200" dirty="0" smtClean="0">
+              <a:solidFill>
+                <a:schemeClr val="tx1"/>
+              </a:solidFill>
+              <a:latin typeface="Arial" pitchFamily="34" charset="0"/>
+              <a:cs typeface="Arial" pitchFamily="34" charset="0"/>
+            </a:endParaRPr>
+          </a:p>
+          <a:p>
+            <a:endParaRPr lang="fr-FR" sz="1200" dirty="0" smtClean="0">
+              <a:solidFill>
+                <a:schemeClr val="tx1"/>
+              </a:solidFill>
+              <a:latin typeface="Arial" pitchFamily="34" charset="0"/>
+              <a:cs typeface="Arial" pitchFamily="34" charset="0"/>
+            </a:endParaRPr>
+          </a:p>
         </p:txBody>
       </p:sp>
       <p:sp>
@@ -3767,25 +3834,53 @@
                 <a:latin typeface="Arial" pitchFamily="34" charset="0"/>
                 <a:cs typeface="Arial" pitchFamily="34" charset="0"/>
               </a:rPr>
-              <a:t>Revenue </a:t>
-            </a:r>
-            <a:r>
-              <a:rPr lang="fr-FR" sz="1400" dirty="0" err="1" smtClean="0">
-                <a:solidFill>
-                  <a:schemeClr val="tx1"/>
-                </a:solidFill>
-                <a:latin typeface="Arial" pitchFamily="34" charset="0"/>
-                <a:cs typeface="Arial" pitchFamily="34" charset="0"/>
-              </a:rPr>
-              <a:t>Streams</a:t>
-            </a:r>
-            <a:endParaRPr lang="fr-FR" sz="1400" dirty="0" smtClean="0">
+              <a:t>Gains </a:t>
+            </a:r>
+          </a:p>
+          <a:p>
+            <a:endParaRPr lang="fr-FR" sz="1200" dirty="0" smtClean="0">
               <a:solidFill>
                 <a:schemeClr val="tx1"/>
               </a:solidFill>
               <a:latin typeface="Arial" pitchFamily="34" charset="0"/>
               <a:cs typeface="Arial" pitchFamily="34" charset="0"/>
             </a:endParaRPr>
+          </a:p>
+          <a:p>
+            <a:r>
+              <a:rPr lang="fr-FR" sz="1200" dirty="0" smtClean="0">
+                <a:solidFill>
+                  <a:schemeClr val="tx1"/>
+                </a:solidFill>
+                <a:latin typeface="Arial" pitchFamily="34" charset="0"/>
+                <a:cs typeface="Arial" pitchFamily="34" charset="0"/>
+              </a:rPr>
+              <a:t>Gain en productivité</a:t>
+            </a:r>
+          </a:p>
+          <a:p>
+            <a:r>
+              <a:rPr lang="fr-FR" sz="1200" dirty="0" smtClean="0">
+                <a:solidFill>
+                  <a:schemeClr val="tx1"/>
+                </a:solidFill>
+                <a:latin typeface="Arial" pitchFamily="34" charset="0"/>
+                <a:cs typeface="Arial" pitchFamily="34" charset="0"/>
+              </a:rPr>
+              <a:t>Meilleure gestion clientèle</a:t>
+            </a:r>
+          </a:p>
+          <a:p>
+            <a:r>
+              <a:rPr lang="fr-FR" sz="1200" dirty="0" smtClean="0">
+                <a:solidFill>
+                  <a:schemeClr val="tx1"/>
+                </a:solidFill>
+                <a:latin typeface="Arial" pitchFamily="34" charset="0"/>
+                <a:cs typeface="Arial" pitchFamily="34" charset="0"/>
+              </a:rPr>
+              <a:t>Augmentation de la clientèle</a:t>
+            </a:r>
           </a:p>
           <a:p>
             <a:endParaRPr lang="fr-FR" sz="1200" dirty="0" smtClean="0">
@@ -3891,7 +3986,27 @@
                 <a:latin typeface="Arial" pitchFamily="34" charset="0"/>
                 <a:cs typeface="Arial" pitchFamily="34" charset="0"/>
               </a:rPr>
-              <a:t>Pas d’application numérique pour les employés</a:t>
+              <a:t>Pas d’application </a:t>
+            </a:r>
+            <a:r>
+              <a:rPr lang="fr-FR" sz="1200" dirty="0" smtClean="0">
+                <a:solidFill>
+                  <a:schemeClr val="tx1"/>
+                </a:solidFill>
+                <a:latin typeface="Arial" pitchFamily="34" charset="0"/>
+                <a:cs typeface="Arial" pitchFamily="34" charset="0"/>
+              </a:rPr>
+              <a:t>web </a:t>
+            </a:r>
+            <a:r>
+              <a:rPr lang="fr-FR" sz="1200" dirty="0" smtClean="0">
+                <a:solidFill>
+                  <a:schemeClr val="tx1"/>
+                </a:solidFill>
+                <a:latin typeface="Arial" pitchFamily="34" charset="0"/>
+                <a:cs typeface="Arial" pitchFamily="34" charset="0"/>
+              </a:rPr>
+              <a:t>pour les employés</a:t>
             </a:r>
           </a:p>
           <a:p>
@@ -3951,13 +4066,6 @@
               </a:rPr>
               <a:t>Bloque le développement de la banque</a:t>
             </a:r>
-            <a:endParaRPr lang="fr-FR" sz="1200" dirty="0" smtClean="0">
-              <a:solidFill>
-                <a:schemeClr val="tx1"/>
-              </a:solidFill>
-              <a:latin typeface="Arial" pitchFamily="34" charset="0"/>
-              <a:cs typeface="Arial" pitchFamily="34" charset="0"/>
-            </a:endParaRPr>
           </a:p>
           <a:p>
             <a:endParaRPr lang="fr-FR" sz="1200" dirty="0" smtClean="0">
@@ -4363,8 +4471,20 @@
                 <a:latin typeface="Arial" pitchFamily="34" charset="0"/>
                 <a:cs typeface="Arial" pitchFamily="34" charset="0"/>
               </a:rPr>
-              <a:t>Avantage compétitif</a:t>
-            </a:r>
+              <a:t>Avantage </a:t>
+            </a:r>
+            <a:r>
+              <a:rPr lang="fr-FR" sz="1400" dirty="0" smtClean="0">
+                <a:solidFill>
+                  <a:schemeClr val="tx1"/>
+                </a:solidFill>
+                <a:latin typeface="Arial" pitchFamily="34" charset="0"/>
+                <a:cs typeface="Arial" pitchFamily="34" charset="0"/>
+              </a:rPr>
+              <a:t>compétitif</a:t>
+            </a:r>
+          </a:p>
+          <a:p>
             <a:endParaRPr lang="fr-FR" sz="1400" dirty="0">
               <a:solidFill>
                 <a:schemeClr val="tx1"/>
@@ -4484,28 +4604,49 @@
           <a:lstStyle/>
           <a:p>
             <a:r>
-              <a:rPr lang="fr-FR" sz="1400" smtClean="0">
+              <a:rPr lang="fr-FR" sz="1400" dirty="0" smtClean="0">
                 <a:solidFill>
                   <a:schemeClr val="tx1"/>
                 </a:solidFill>
                 <a:latin typeface="Arial" pitchFamily="34" charset="0"/>
                 <a:cs typeface="Arial" pitchFamily="34" charset="0"/>
               </a:rPr>
-              <a:t>Channels</a:t>
-            </a:r>
-          </a:p>
-          <a:p>
-            <a:r>
-              <a:rPr lang="fr-FR" sz="1200" smtClean="0">
+              <a:t>Canaux</a:t>
+            </a:r>
+          </a:p>
+          <a:p>
+            <a:endParaRPr lang="fr-FR" sz="1400" dirty="0" smtClean="0">
+              <a:solidFill>
+                <a:schemeClr val="tx1"/>
+              </a:solidFill>
+              <a:latin typeface="Arial" pitchFamily="34" charset="0"/>
+              <a:cs typeface="Arial" pitchFamily="34" charset="0"/>
+            </a:endParaRPr>
+          </a:p>
+          <a:p>
+            <a:r>
+              <a:rPr lang="fr-FR" sz="1200" dirty="0" smtClean="0">
                 <a:solidFill>
                   <a:schemeClr val="tx1"/>
                 </a:solidFill>
                 <a:latin typeface="Arial" pitchFamily="34" charset="0"/>
                 <a:cs typeface="Arial" pitchFamily="34" charset="0"/>
               </a:rPr>
-              <a:t>Path to customers</a:t>
-            </a:r>
-            <a:endParaRPr lang="fr-FR" sz="1200">
+              <a:t>- mailing interne</a:t>
+            </a:r>
+          </a:p>
+          <a:p>
+            <a:r>
+              <a:rPr lang="fr-FR" sz="1200" dirty="0" smtClean="0">
+                <a:solidFill>
+                  <a:schemeClr val="tx1"/>
+                </a:solidFill>
+                <a:latin typeface="Arial" pitchFamily="34" charset="0"/>
+                <a:cs typeface="Arial" pitchFamily="34" charset="0"/>
+              </a:rPr>
+              <a:t>- Formation pour utiliser l’application</a:t>
+            </a:r>
+            <a:endParaRPr lang="fr-FR" sz="1200" dirty="0">
               <a:solidFill>
                 <a:schemeClr val="tx1"/>
               </a:solidFill>
@@ -4587,6 +4728,15 @@
             </a:r>
           </a:p>
           <a:p>
+            <a:endParaRPr lang="fr-FR" sz="1400" dirty="0" smtClean="0">
+              <a:solidFill>
+                <a:schemeClr val="tx1"/>
+              </a:solidFill>
+              <a:latin typeface="Arial" pitchFamily="34" charset="0"/>
+              <a:cs typeface="Arial" pitchFamily="34" charset="0"/>
+            </a:endParaRPr>
+          </a:p>
+          <a:p>
             <a:r>
               <a:rPr lang="fr-FR" sz="1200" dirty="0" smtClean="0">
                 <a:solidFill>
@@ -4830,27 +4980,39 @@
                 <a:latin typeface="Arial" pitchFamily="34" charset="0"/>
                 <a:cs typeface="Arial" pitchFamily="34" charset="0"/>
               </a:rPr>
-              <a:t>Cibles privilégiées</a:t>
-            </a:r>
-          </a:p>
-          <a:p>
-            <a:r>
-              <a:rPr lang="fr-FR" sz="1200" dirty="0">
+              <a:t>Cibles </a:t>
+            </a:r>
+            <a:r>
+              <a:rPr lang="fr-FR" sz="1400" dirty="0" smtClean="0">
                 <a:solidFill>
                   <a:schemeClr val="tx1"/>
                 </a:solidFill>
                 <a:latin typeface="Arial" pitchFamily="34" charset="0"/>
                 <a:cs typeface="Arial" pitchFamily="34" charset="0"/>
               </a:rPr>
-              <a:t>Conseillers bancaire</a:t>
-            </a:r>
-            <a:endParaRPr lang="fr-FR" sz="1200" dirty="0">
+              <a:t>privilégiées</a:t>
+            </a:r>
+          </a:p>
+          <a:p>
+            <a:endParaRPr lang="fr-FR" sz="1400" dirty="0">
               <a:solidFill>
                 <a:schemeClr val="tx1"/>
               </a:solidFill>
               <a:latin typeface="Arial" pitchFamily="34" charset="0"/>
               <a:cs typeface="Arial" pitchFamily="34" charset="0"/>
             </a:endParaRPr>
+          </a:p>
+          <a:p>
+            <a:r>
+              <a:rPr lang="fr-FR" sz="1200" dirty="0">
+                <a:solidFill>
+                  <a:schemeClr val="tx1"/>
+                </a:solidFill>
+                <a:latin typeface="Arial" pitchFamily="34" charset="0"/>
+                <a:cs typeface="Arial" pitchFamily="34" charset="0"/>
+              </a:rPr>
+              <a:t>Conseillers bancaire</a:t>
+            </a:r>
           </a:p>
         </p:txBody>
       </p:sp>
@@ -4926,6 +5088,15 @@
             </a:r>
           </a:p>
           <a:p>
+            <a:endParaRPr lang="fr-FR" sz="1400" dirty="0" smtClean="0">
+              <a:solidFill>
+                <a:schemeClr val="tx1"/>
+              </a:solidFill>
+              <a:latin typeface="Arial" pitchFamily="34" charset="0"/>
+              <a:cs typeface="Arial" pitchFamily="34" charset="0"/>
+            </a:endParaRPr>
+          </a:p>
+          <a:p>
             <a:r>
               <a:rPr lang="fr-FR" sz="1200" dirty="0" err="1" smtClean="0">
                 <a:solidFill>
@@ -4934,17 +5105,17 @@
                 <a:latin typeface="Arial" pitchFamily="34" charset="0"/>
                 <a:cs typeface="Arial" pitchFamily="34" charset="0"/>
               </a:rPr>
-              <a:t>ProxiBanque</a:t>
-            </a:r>
-            <a:r>
-              <a:rPr lang="fr-FR" sz="1200" dirty="0" err="1" smtClean="0">
+              <a:t>ProxiBanqueSI</a:t>
+            </a:r>
+            <a:r>
+              <a:rPr lang="fr-FR" sz="1200" dirty="0" smtClean="0">
                 <a:solidFill>
                   <a:schemeClr val="tx1"/>
                 </a:solidFill>
                 <a:latin typeface="Arial" pitchFamily="34" charset="0"/>
                 <a:cs typeface="Arial" pitchFamily="34" charset="0"/>
               </a:rPr>
-              <a:t>SI</a:t>
+              <a:t> au service </a:t>
             </a:r>
             <a:r>
               <a:rPr lang="fr-FR" sz="1200" dirty="0" smtClean="0">
@@ -4954,7 +5125,7 @@
                 <a:latin typeface="Arial" pitchFamily="34" charset="0"/>
                 <a:cs typeface="Arial" pitchFamily="34" charset="0"/>
               </a:rPr>
-              <a:t> au service de la performance</a:t>
+              <a:t>de nos clients</a:t>
             </a:r>
             <a:endParaRPr lang="fr-FR" sz="1200" dirty="0">
               <a:solidFill>
@@ -4979,7 +5150,7 @@
   <p:timing>
     <p:tnLst>
       <p:par>
-        <p:cTn xmlns:p14="http://schemas.microsoft.com/office/powerpoint/2010/main" id="1" dur="indefinite" restart="never" nodeType="tmRoot"/>
+        <p:cTn id="1" dur="indefinite" restart="never" nodeType="tmRoot"/>
       </p:par>
     </p:tnLst>
   </p:timing>

</xml_diff>